<commit_message>
adding exam for oop
</commit_message>
<xml_diff>
--- a/OOP/Midterm/Week 6/Lecture/Abstraction and Interfaces.1 - Copy.pptx
+++ b/OOP/Midterm/Week 6/Lecture/Abstraction and Interfaces.1 - Copy.pptx
@@ -377,7 +377,7 @@
           <a:p>
             <a:fld id="{09872B84-9FE1-434E-A2D2-E973C393975E}" type="datetimeFigureOut">
               <a:rPr lang="en-PH" smtClean="0"/>
-              <a:t>9/23/2025</a:t>
+              <a:t>9/25/2025</a:t>
             </a:fld>
             <a:endParaRPr lang="en-PH"/>
           </a:p>
@@ -1370,7 +1370,7 @@
           <a:p>
             <a:fld id="{97777D41-A4CA-47AC-B7F9-CEF2233B7831}" type="datetimeFigureOut">
               <a:rPr lang="en-PH" smtClean="0"/>
-              <a:t>9/23/2025</a:t>
+              <a:t>9/25/2025</a:t>
             </a:fld>
             <a:endParaRPr lang="en-PH"/>
           </a:p>
@@ -1570,7 +1570,7 @@
           <a:p>
             <a:fld id="{97777D41-A4CA-47AC-B7F9-CEF2233B7831}" type="datetimeFigureOut">
               <a:rPr lang="en-PH" smtClean="0"/>
-              <a:t>9/23/2025</a:t>
+              <a:t>9/25/2025</a:t>
             </a:fld>
             <a:endParaRPr lang="en-PH"/>
           </a:p>
@@ -1780,7 +1780,7 @@
           <a:p>
             <a:fld id="{97777D41-A4CA-47AC-B7F9-CEF2233B7831}" type="datetimeFigureOut">
               <a:rPr lang="en-PH" smtClean="0"/>
-              <a:t>9/23/2025</a:t>
+              <a:t>9/25/2025</a:t>
             </a:fld>
             <a:endParaRPr lang="en-PH"/>
           </a:p>
@@ -1980,7 +1980,7 @@
           <a:p>
             <a:fld id="{97777D41-A4CA-47AC-B7F9-CEF2233B7831}" type="datetimeFigureOut">
               <a:rPr lang="en-PH" smtClean="0"/>
-              <a:t>9/23/2025</a:t>
+              <a:t>9/25/2025</a:t>
             </a:fld>
             <a:endParaRPr lang="en-PH"/>
           </a:p>
@@ -2256,7 +2256,7 @@
           <a:p>
             <a:fld id="{97777D41-A4CA-47AC-B7F9-CEF2233B7831}" type="datetimeFigureOut">
               <a:rPr lang="en-PH" smtClean="0"/>
-              <a:t>9/23/2025</a:t>
+              <a:t>9/25/2025</a:t>
             </a:fld>
             <a:endParaRPr lang="en-PH"/>
           </a:p>
@@ -2524,7 +2524,7 @@
           <a:p>
             <a:fld id="{97777D41-A4CA-47AC-B7F9-CEF2233B7831}" type="datetimeFigureOut">
               <a:rPr lang="en-PH" smtClean="0"/>
-              <a:t>9/23/2025</a:t>
+              <a:t>9/25/2025</a:t>
             </a:fld>
             <a:endParaRPr lang="en-PH"/>
           </a:p>
@@ -2939,7 +2939,7 @@
           <a:p>
             <a:fld id="{97777D41-A4CA-47AC-B7F9-CEF2233B7831}" type="datetimeFigureOut">
               <a:rPr lang="en-PH" smtClean="0"/>
-              <a:t>9/23/2025</a:t>
+              <a:t>9/25/2025</a:t>
             </a:fld>
             <a:endParaRPr lang="en-PH"/>
           </a:p>
@@ -3081,7 +3081,7 @@
           <a:p>
             <a:fld id="{97777D41-A4CA-47AC-B7F9-CEF2233B7831}" type="datetimeFigureOut">
               <a:rPr lang="en-PH" smtClean="0"/>
-              <a:t>9/23/2025</a:t>
+              <a:t>9/25/2025</a:t>
             </a:fld>
             <a:endParaRPr lang="en-PH"/>
           </a:p>
@@ -3194,7 +3194,7 @@
           <a:p>
             <a:fld id="{97777D41-A4CA-47AC-B7F9-CEF2233B7831}" type="datetimeFigureOut">
               <a:rPr lang="en-PH" smtClean="0"/>
-              <a:t>9/23/2025</a:t>
+              <a:t>9/25/2025</a:t>
             </a:fld>
             <a:endParaRPr lang="en-PH"/>
           </a:p>
@@ -3507,7 +3507,7 @@
           <a:p>
             <a:fld id="{97777D41-A4CA-47AC-B7F9-CEF2233B7831}" type="datetimeFigureOut">
               <a:rPr lang="en-PH" smtClean="0"/>
-              <a:t>9/23/2025</a:t>
+              <a:t>9/25/2025</a:t>
             </a:fld>
             <a:endParaRPr lang="en-PH"/>
           </a:p>
@@ -3796,7 +3796,7 @@
           <a:p>
             <a:fld id="{97777D41-A4CA-47AC-B7F9-CEF2233B7831}" type="datetimeFigureOut">
               <a:rPr lang="en-PH" smtClean="0"/>
-              <a:t>9/23/2025</a:t>
+              <a:t>9/25/2025</a:t>
             </a:fld>
             <a:endParaRPr lang="en-PH"/>
           </a:p>
@@ -4039,7 +4039,7 @@
           <a:p>
             <a:fld id="{97777D41-A4CA-47AC-B7F9-CEF2233B7831}" type="datetimeFigureOut">
               <a:rPr lang="en-PH" smtClean="0"/>
-              <a:t>9/23/2025</a:t>
+              <a:t>9/25/2025</a:t>
             </a:fld>
             <a:endParaRPr lang="en-PH"/>
           </a:p>
@@ -5975,7 +5975,7 @@
         </p:nvSpPr>
         <p:spPr>
           <a:xfrm>
-            <a:off x="1658437" y="2020473"/>
+            <a:off x="1524369" y="2041472"/>
             <a:ext cx="8480174" cy="2775055"/>
           </a:xfrm>
           <a:prstGeom prst="rect">

</xml_diff>